<commit_message>
Minor fixes and add todos
</commit_message>
<xml_diff>
--- a/Courses/Software-Sciences/Module-4-Information-Systems-New/05-Connecting-Windows-Forms-with-database/05-Connecting-Windows-Forms-with-database.pptx
+++ b/Courses/Software-Sciences/Module-4-Information-Systems-New/05-Connecting-Windows-Forms-with-database/05-Connecting-Windows-Forms-with-database.pptx
@@ -240,6 +240,32 @@
 </p188:authorLst>
 </file>
 
+<file path=ppt/commentAuthors.xml><?xml version="1.0" encoding="utf-8"?>
+<p:cmAuthorLst xmlns:a="http://schemas.openxmlformats.org/drawingml/2006/main" xmlns:r="http://schemas.openxmlformats.org/officeDocument/2006/relationships" xmlns:p="http://schemas.openxmlformats.org/presentationml/2006/main">
+  <p:cmAuthor id="1" name="PC" initials="P" lastIdx="1" clrIdx="0">
+    <p:extLst>
+      <p:ext uri="{19B8F6BF-5375-455C-9EA6-DF929625EA0E}">
+        <p15:presenceInfo xmlns:p15="http://schemas.microsoft.com/office/powerpoint/2012/main" userId="PC" providerId="None"/>
+      </p:ext>
+    </p:extLst>
+  </p:cmAuthor>
+</p:cmAuthorLst>
+</file>
+
+<file path=ppt/comments/comment1.xml><?xml version="1.0" encoding="utf-8"?>
+<p:cmLst xmlns:a="http://schemas.openxmlformats.org/drawingml/2006/main" xmlns:r="http://schemas.openxmlformats.org/officeDocument/2006/relationships" xmlns:p="http://schemas.openxmlformats.org/presentationml/2006/main">
+  <p:cm authorId="1" dt="2024-10-02T18:48:08.042" idx="1">
+    <p:pos x="10" y="10"/>
+    <p:text>Не е препоръчително снимките на заглавните слайдове да са черни. По-добре е да са бели :). Можеш да просто да invert-неш цвета на снимката</p:text>
+    <p:extLst>
+      <p:ext uri="{C676402C-5697-4E1C-873F-D02D1690AC5C}">
+        <p15:threadingInfo xmlns:p15="http://schemas.microsoft.com/office/powerpoint/2012/main" timeZoneBias="-180"/>
+      </p:ext>
+    </p:extLst>
+  </p:cm>
+</p:cmLst>
+</file>
+
 <file path=ppt/handoutMasters/handoutMaster1.xml><?xml version="1.0" encoding="utf-8"?>
 <p:handoutMaster xmlns:a="http://schemas.openxmlformats.org/drawingml/2006/main" xmlns:r="http://schemas.openxmlformats.org/officeDocument/2006/relationships" xmlns:p="http://schemas.openxmlformats.org/presentationml/2006/main">
   <p:cSld>
@@ -334,7 +360,7 @@
           <a:p>
             <a:fld id="{4E087215-0C8F-4762-A664-737A353EC9A4}" type="datetimeFigureOut">
               <a:rPr lang="bg-BG" smtClean="0"/>
-              <a:t>30.09.24 г.</a:t>
+              <a:t>2.10.2024 г.</a:t>
             </a:fld>
             <a:endParaRPr lang="bg-BG"/>
           </a:p>
@@ -530,7 +556,7 @@
           <a:p>
             <a:fld id="{72D84649-876A-46C9-8472-14CB09C070D8}" type="datetimeFigureOut">
               <a:rPr lang="en-US" smtClean="0"/>
-              <a:t>9/30/24</a:t>
+              <a:t>10/2/2024</a:t>
             </a:fld>
             <a:endParaRPr lang="en-US"/>
           </a:p>
@@ -8268,7 +8294,7 @@
           <p:nvPr/>
         </p:nvPicPr>
         <p:blipFill>
-          <a:blip r:embed="rId5">
+          <a:blip r:embed="rId5" cstate="hqprint">
             <a:extLst>
               <a:ext uri="{28A0092B-C50C-407E-A947-70E740481C1C}">
                 <a14:useLocalDpi xmlns:a14="http://schemas.microsoft.com/office/drawing/2010/main" val="0"/>
@@ -8316,6 +8342,13 @@
       <p:transition spd="slow" advClick="0" advTm="5000"/>
     </mc:Fallback>
   </mc:AlternateContent>
+  <p:timing>
+    <p:tnLst>
+      <p:par>
+        <p:cTn id="1" dur="indefinite" restart="never" nodeType="tmRoot"/>
+      </p:par>
+    </p:tnLst>
+  </p:timing>
 </p:sld>
 </file>
 
@@ -8644,7 +8677,7 @@
           <p:nvPr/>
         </p:nvPicPr>
         <p:blipFill>
-          <a:blip r:embed="rId2">
+          <a:blip r:embed="rId2" cstate="hqprint">
             <a:extLst>
               <a:ext uri="{28A0092B-C50C-407E-A947-70E740481C1C}">
                 <a14:useLocalDpi xmlns:a14="http://schemas.microsoft.com/office/drawing/2010/main" val="0"/>
@@ -10673,33 +10706,15 @@
                                   </p:childTnLst>
                                 </p:cTn>
                               </p:par>
-                            </p:childTnLst>
-                          </p:cTn>
-                        </p:par>
-                      </p:childTnLst>
-                    </p:cTn>
-                  </p:par>
-                  <p:par>
-                    <p:cTn id="33" fill="hold">
-                      <p:stCondLst>
-                        <p:cond delay="indefinite"/>
-                      </p:stCondLst>
-                      <p:childTnLst>
-                        <p:par>
-                          <p:cTn id="34" fill="hold">
-                            <p:stCondLst>
-                              <p:cond delay="0"/>
-                            </p:stCondLst>
-                            <p:childTnLst>
                               <p:par>
-                                <p:cTn id="35" presetID="1" presetClass="entr" presetSubtype="0" fill="hold" nodeType="clickEffect">
+                                <p:cTn id="33" presetID="1" presetClass="entr" presetSubtype="0" fill="hold" nodeType="withEffect">
                                   <p:stCondLst>
                                     <p:cond delay="0"/>
                                   </p:stCondLst>
                                   <p:childTnLst>
                                     <p:set>
                                       <p:cBhvr>
-                                        <p:cTn id="36" dur="1" fill="hold">
+                                        <p:cTn id="34" dur="1" fill="hold">
                                           <p:stCondLst>
                                             <p:cond delay="0"/>
                                           </p:stCondLst>
@@ -10844,7 +10859,7 @@
           <p:nvPr/>
         </p:nvPicPr>
         <p:blipFill>
-          <a:blip r:embed="rId3">
+          <a:blip r:embed="rId3" cstate="hqprint">
             <a:extLst>
               <a:ext uri="{28A0092B-C50C-407E-A947-70E740481C1C}">
                 <a14:useLocalDpi xmlns:a14="http://schemas.microsoft.com/office/drawing/2010/main" val="0"/>
@@ -10883,6 +10898,13 @@
       <p:transition spd="slow" advClick="0" advTm="5000"/>
     </mc:Fallback>
   </mc:AlternateContent>
+  <p:timing>
+    <p:tnLst>
+      <p:par>
+        <p:cTn id="1" dur="indefinite" restart="never" nodeType="tmRoot"/>
+      </p:par>
+    </p:tnLst>
+  </p:timing>
 </p:sld>
 </file>
 
@@ -13235,6 +13257,13 @@
       <p:transition spd="slow" advClick="0" advTm="5000"/>
     </mc:Fallback>
   </mc:AlternateContent>
+  <p:timing>
+    <p:tnLst>
+      <p:par>
+        <p:cTn id="1" dur="indefinite" restart="never" nodeType="tmRoot"/>
+      </p:par>
+    </p:tnLst>
+  </p:timing>
 </p:sld>
 </file>
 
@@ -13880,6 +13909,13 @@
       <p:transition spd="slow" advClick="0" advTm="5000"/>
     </mc:Fallback>
   </mc:AlternateContent>
+  <p:timing>
+    <p:tnLst>
+      <p:par>
+        <p:cTn id="1" dur="indefinite" restart="never" nodeType="tmRoot"/>
+      </p:par>
+    </p:tnLst>
+  </p:timing>
 </p:sld>
 </file>
 
@@ -17662,6 +17698,13 @@
       <p:transition spd="slow" advClick="0" advTm="5000"/>
     </mc:Fallback>
   </mc:AlternateContent>
+  <p:timing>
+    <p:tnLst>
+      <p:par>
+        <p:cTn id="1" dur="indefinite" restart="never" nodeType="tmRoot"/>
+      </p:par>
+    </p:tnLst>
+  </p:timing>
 </p:sld>
 </file>
 
@@ -20883,7 +20926,7 @@
           <p:nvPr/>
         </p:nvPicPr>
         <p:blipFill>
-          <a:blip r:embed="rId3">
+          <a:blip r:embed="rId3" cstate="hqprint">
             <a:extLst>
               <a:ext uri="{28A0092B-C50C-407E-A947-70E740481C1C}">
                 <a14:useLocalDpi xmlns:a14="http://schemas.microsoft.com/office/drawing/2010/main" val="0"/>
@@ -20922,6 +20965,13 @@
       <p:transition spd="slow" advClick="0" advTm="5000"/>
     </mc:Fallback>
   </mc:AlternateContent>
+  <p:timing>
+    <p:tnLst>
+      <p:par>
+        <p:cTn id="1" dur="indefinite" restart="never" nodeType="tmRoot"/>
+      </p:par>
+    </p:tnLst>
+  </p:timing>
 </p:sld>
 </file>
 
@@ -22039,33 +22089,15 @@
                                   </p:childTnLst>
                                 </p:cTn>
                               </p:par>
-                            </p:childTnLst>
-                          </p:cTn>
-                        </p:par>
-                      </p:childTnLst>
-                    </p:cTn>
-                  </p:par>
-                  <p:par>
-                    <p:cTn id="19" fill="hold">
-                      <p:stCondLst>
-                        <p:cond delay="indefinite"/>
-                      </p:stCondLst>
-                      <p:childTnLst>
-                        <p:par>
-                          <p:cTn id="20" fill="hold">
-                            <p:stCondLst>
-                              <p:cond delay="0"/>
-                            </p:stCondLst>
-                            <p:childTnLst>
                               <p:par>
-                                <p:cTn id="21" presetID="1" presetClass="entr" presetSubtype="0" fill="hold" nodeType="clickEffect">
+                                <p:cTn id="19" presetID="1" presetClass="entr" presetSubtype="0" fill="hold" nodeType="withEffect">
                                   <p:stCondLst>
                                     <p:cond delay="0"/>
                                   </p:stCondLst>
                                   <p:childTnLst>
                                     <p:set>
                                       <p:cBhvr>
-                                        <p:cTn id="22" dur="1" fill="hold">
+                                        <p:cTn id="20" dur="1" fill="hold">
                                           <p:stCondLst>
                                             <p:cond delay="0"/>
                                           </p:stCondLst>
@@ -25293,7 +25325,7 @@
                 <a:hlinkClick r:id="rId3">
                   <a:extLst>
                     <a:ext uri="{A12FA001-AC4F-418D-AE19-62706E023703}">
-                      <ahyp:hlinkClr xmlns:ahyp="http://schemas.microsoft.com/office/drawing/2018/hyperlinkcolor" val="tx"/>
+                      <ahyp:hlinkClr xmlns:ahyp="http://schemas.microsoft.com/office/drawing/2018/hyperlinkcolor" xmlns="" val="tx"/>
                     </a:ext>
                   </a:extLst>
                 </a:hlinkClick>
@@ -25366,6 +25398,13 @@
       <p:transition spd="slow" advClick="0" advTm="5000"/>
     </mc:Fallback>
   </mc:AlternateContent>
+  <p:timing>
+    <p:tnLst>
+      <p:par>
+        <p:cTn id="1" dur="indefinite" restart="never" nodeType="tmRoot"/>
+      </p:par>
+    </p:tnLst>
+  </p:timing>
 </p:sld>
 </file>
 
@@ -28659,8 +28698,8 @@
         </p:nvSpPr>
         <p:spPr bwMode="auto">
           <a:xfrm>
-            <a:off x="929152" y="5999968"/>
-            <a:ext cx="4396551" cy="533648"/>
+            <a:off x="2181000" y="5999968"/>
+            <a:ext cx="3144703" cy="533648"/>
           </a:xfrm>
           <a:prstGeom prst="wedgeRoundRectCallout">
             <a:avLst>
@@ -28772,8 +28811,8 @@
         </p:nvSpPr>
         <p:spPr bwMode="auto">
           <a:xfrm>
-            <a:off x="1056000" y="3192624"/>
-            <a:ext cx="4510845" cy="530182"/>
+            <a:off x="2586000" y="3192624"/>
+            <a:ext cx="2890845" cy="530182"/>
           </a:xfrm>
           <a:prstGeom prst="wedgeRoundRectCallout">
             <a:avLst>
@@ -29196,7 +29235,7 @@
           <p:nvPr/>
         </p:nvPicPr>
         <p:blipFill>
-          <a:blip r:embed="rId3">
+          <a:blip r:embed="rId3" cstate="hqprint">
             <a:extLst>
               <a:ext uri="{28A0092B-C50C-407E-A947-70E740481C1C}">
                 <a14:useLocalDpi xmlns:a14="http://schemas.microsoft.com/office/drawing/2010/main" val="0"/>
@@ -29235,6 +29274,13 @@
       <p:transition spd="slow" advClick="0" advTm="5000"/>
     </mc:Fallback>
   </mc:AlternateContent>
+  <p:timing>
+    <p:tnLst>
+      <p:par>
+        <p:cTn id="1" dur="indefinite" restart="never" nodeType="tmRoot"/>
+      </p:par>
+    </p:tnLst>
+  </p:timing>
 </p:sld>
 </file>
 

</xml_diff>